<commit_message>
update posters for CVPR
</commit_message>
<xml_diff>
--- a/cvcops_2018/Poster_Robust_CAM.pptx
+++ b/cvcops_2018/Poster_Robust_CAM.pptx
@@ -4548,36 +4548,6 @@
           </a:p>
         </p:txBody>
       </p:sp>
-      <p:pic>
-        <p:nvPicPr>
-          <p:cNvPr id="32" name="Picture 31"/>
-          <p:cNvPicPr>
-            <a:picLocks noChangeAspect="1"/>
-          </p:cNvPicPr>
-          <p:nvPr/>
-        </p:nvPicPr>
-        <p:blipFill>
-          <a:blip r:embed="rId9">
-            <a:extLst>
-              <a:ext uri="{28A0092B-C50C-407E-A947-70E740481C1C}">
-                <a14:useLocalDpi xmlns:a14="http://schemas.microsoft.com/office/drawing/2010/main" val="0"/>
-              </a:ext>
-            </a:extLst>
-          </a:blip>
-          <a:stretch>
-            <a:fillRect/>
-          </a:stretch>
-        </p:blipFill>
-        <p:spPr>
-          <a:xfrm>
-            <a:off x="35966400" y="182369"/>
-            <a:ext cx="6791965" cy="4443078"/>
-          </a:xfrm>
-          <a:prstGeom prst="rect">
-            <a:avLst/>
-          </a:prstGeom>
-        </p:spPr>
-      </p:pic>
       <p:sp>
         <p:nvSpPr>
           <p:cNvPr id="37" name="TextBox 36"/>
@@ -5042,7 +5012,7 @@
           <p:nvPr/>
         </p:nvPicPr>
         <p:blipFill>
-          <a:blip r:embed="rId10"/>
+          <a:blip r:embed="rId9"/>
           <a:stretch>
             <a:fillRect/>
           </a:stretch>
@@ -5090,7 +5060,7 @@
           <p:nvPr/>
         </p:nvPicPr>
         <p:blipFill>
-          <a:blip r:embed="rId11"/>
+          <a:blip r:embed="rId10"/>
           <a:stretch>
             <a:fillRect/>
           </a:stretch>
@@ -5138,7 +5108,7 @@
           <p:nvPr/>
         </p:nvPicPr>
         <p:blipFill>
-          <a:blip r:embed="rId12"/>
+          <a:blip r:embed="rId11"/>
           <a:stretch>
             <a:fillRect/>
           </a:stretch>
@@ -5186,7 +5156,7 @@
           <p:nvPr/>
         </p:nvPicPr>
         <p:blipFill>
-          <a:blip r:embed="rId13"/>
+          <a:blip r:embed="rId12"/>
           <a:stretch>
             <a:fillRect/>
           </a:stretch>
@@ -5234,7 +5204,7 @@
           <p:nvPr/>
         </p:nvPicPr>
         <p:blipFill>
-          <a:blip r:embed="rId14"/>
+          <a:blip r:embed="rId13"/>
           <a:stretch>
             <a:fillRect/>
           </a:stretch>
@@ -5282,7 +5252,7 @@
           <p:nvPr/>
         </p:nvPicPr>
         <p:blipFill>
-          <a:blip r:embed="rId15"/>
+          <a:blip r:embed="rId14"/>
           <a:stretch>
             <a:fillRect/>
           </a:stretch>
@@ -5757,7 +5727,7 @@
           <p:nvPr/>
         </p:nvPicPr>
         <p:blipFill rotWithShape="1">
-          <a:blip r:embed="rId16"/>
+          <a:blip r:embed="rId15"/>
           <a:srcRect t="7846"/>
           <a:stretch/>
         </p:blipFill>
@@ -5780,7 +5750,7 @@
           <p:nvPr/>
         </p:nvPicPr>
         <p:blipFill rotWithShape="1">
-          <a:blip r:embed="rId17"/>
+          <a:blip r:embed="rId16"/>
           <a:srcRect t="6110"/>
           <a:stretch/>
         </p:blipFill>
@@ -5925,7 +5895,7 @@
               <p:nvPr/>
             </p:nvPicPr>
             <p:blipFill>
-              <a:blip r:embed="rId18">
+              <a:blip r:embed="rId17">
                 <a:extLst>
                   <a:ext uri="{28A0092B-C50C-407E-A947-70E740481C1C}">
                     <a14:useLocalDpi xmlns:a14="http://schemas.microsoft.com/office/drawing/2010/main" val="0"/>
@@ -6013,7 +5983,7 @@
               <p:nvPr/>
             </p:nvPicPr>
             <p:blipFill>
-              <a:blip r:embed="rId19">
+              <a:blip r:embed="rId18">
                 <a:extLst>
                   <a:ext uri="{28A0092B-C50C-407E-A947-70E740481C1C}">
                     <a14:useLocalDpi xmlns:a14="http://schemas.microsoft.com/office/drawing/2010/main" val="0"/>
@@ -6116,7 +6086,7 @@
               <p:nvPr/>
             </p:nvPicPr>
             <p:blipFill rotWithShape="1">
-              <a:blip r:embed="rId20"/>
+              <a:blip r:embed="rId19"/>
               <a:srcRect t="3299"/>
               <a:stretch/>
             </p:blipFill>
@@ -6139,7 +6109,7 @@
               <p:nvPr/>
             </p:nvPicPr>
             <p:blipFill>
-              <a:blip r:embed="rId21"/>
+              <a:blip r:embed="rId20"/>
               <a:stretch>
                 <a:fillRect/>
               </a:stretch>
@@ -6399,7 +6369,7 @@
             <p:nvPr/>
           </p:nvPicPr>
           <p:blipFill>
-            <a:blip r:embed="rId22"/>
+            <a:blip r:embed="rId21"/>
             <a:stretch>
               <a:fillRect/>
             </a:stretch>
@@ -6650,6 +6620,36 @@
           </p:txBody>
         </p:sp>
       </p:grpSp>
+      <p:pic>
+        <p:nvPicPr>
+          <p:cNvPr id="55" name="Picture 54"/>
+          <p:cNvPicPr>
+            <a:picLocks noChangeAspect="1"/>
+          </p:cNvPicPr>
+          <p:nvPr/>
+        </p:nvPicPr>
+        <p:blipFill>
+          <a:blip r:embed="rId22">
+            <a:extLst>
+              <a:ext uri="{28A0092B-C50C-407E-A947-70E740481C1C}">
+                <a14:useLocalDpi xmlns:a14="http://schemas.microsoft.com/office/drawing/2010/main" val="0"/>
+              </a:ext>
+            </a:extLst>
+          </a:blip>
+          <a:stretch>
+            <a:fillRect/>
+          </a:stretch>
+        </p:blipFill>
+        <p:spPr>
+          <a:xfrm>
+            <a:off x="36886050" y="40287"/>
+            <a:ext cx="6222865" cy="4070792"/>
+          </a:xfrm>
+          <a:prstGeom prst="rect">
+            <a:avLst/>
+          </a:prstGeom>
+        </p:spPr>
+      </p:pic>
     </p:spTree>
   </p:cSld>
   <p:clrMapOvr>
@@ -7343,7 +7343,7 @@
 
 <file path=customXml/item1.xml><?xml version="1.0" encoding="utf-8"?>
 <Control xmlns="http://schemas.microsoft.com/VisualStudio/2011/storyboarding/control">
-  <Id Name="System.Storyboarding.WindowsAppIcons.Mail" Revision="1" Stencil="System.Storyboarding.WindowsAppIcons" StencilVersion="0.1"/>
+  <Id Name="054771f3-eaf3-4e44-ba04-c07f5f7e51ff" Revision="1" Stencil="System.MyShapes" StencilVersion="1.0"/>
 </Control>
 </file>
 
@@ -7355,7 +7355,7 @@
 
 <file path=customXml/item11.xml><?xml version="1.0" encoding="utf-8"?>
 <Control xmlns="http://schemas.microsoft.com/VisualStudio/2011/storyboarding/control">
-  <Id Name="054771f3-eaf3-4e44-ba04-c07f5f7e51ff" Revision="1" Stencil="System.MyShapes" StencilVersion="1.0"/>
+  <Id Name="System.Storyboarding.WindowsAppIcons.Mail" Revision="1" Stencil="System.Storyboarding.WindowsAppIcons" StencilVersion="0.1"/>
 </Control>
 </file>
 
@@ -7385,7 +7385,7 @@
 
 <file path=customXml/item4.xml><?xml version="1.0" encoding="utf-8"?>
 <Control xmlns="http://schemas.microsoft.com/VisualStudio/2011/storyboarding/control">
-  <Id Name="054771f3-eaf3-4e44-ba04-c07f5f7e51ff" Revision="1" Stencil="System.MyShapes" StencilVersion="1.0"/>
+  <Id Name="System.Storyboarding.WindowsAppIcons.Mail" Revision="1" Stencil="System.Storyboarding.WindowsAppIcons" StencilVersion="0.1"/>
 </Control>
 </file>
 
@@ -7415,11 +7415,27 @@
 
 <file path=customXml/item9.xml><?xml version="1.0" encoding="utf-8"?>
 <Control xmlns="http://schemas.microsoft.com/VisualStudio/2011/storyboarding/control">
-  <Id Name="System.Storyboarding.WindowsAppIcons.Mail" Revision="1" Stencil="System.Storyboarding.WindowsAppIcons" StencilVersion="0.1"/>
+  <Id Name="054771f3-eaf3-4e44-ba04-c07f5f7e51ff" Revision="1" Stencil="System.MyShapes" StencilVersion="1.0"/>
 </Control>
 </file>
 
 <file path=customXml/itemProps1.xml><?xml version="1.0" encoding="utf-8"?>
+<ds:datastoreItem xmlns:ds="http://schemas.openxmlformats.org/officeDocument/2006/customXml" ds:itemID="{825FAB6A-4A4D-4DA3-B2C3-45CDD3B87FC7}">
+  <ds:schemaRefs>
+    <ds:schemaRef ds:uri="http://schemas.microsoft.com/VisualStudio/2011/storyboarding/control"/>
+  </ds:schemaRefs>
+</ds:datastoreItem>
+</file>
+
+<file path=customXml/itemProps10.xml><?xml version="1.0" encoding="utf-8"?>
+<ds:datastoreItem xmlns:ds="http://schemas.openxmlformats.org/officeDocument/2006/customXml" ds:itemID="{A0ACBFB0-2DCA-46A6-9DA4-D63F80C0E485}">
+  <ds:schemaRefs>
+    <ds:schemaRef ds:uri="http://schemas.microsoft.com/VisualStudio/2011/storyboarding/control"/>
+  </ds:schemaRefs>
+</ds:datastoreItem>
+</file>
+
+<file path=customXml/itemProps11.xml><?xml version="1.0" encoding="utf-8"?>
 <ds:datastoreItem xmlns:ds="http://schemas.openxmlformats.org/officeDocument/2006/customXml" ds:itemID="{6812B51C-89AB-406D-80F2-D1F68F137915}">
   <ds:schemaRefs>
     <ds:schemaRef ds:uri="http://schemas.microsoft.com/VisualStudio/2011/storyboarding/control"/>
@@ -7427,7 +7443,23 @@
 </ds:datastoreItem>
 </file>
 
-<file path=customXml/itemProps10.xml><?xml version="1.0" encoding="utf-8"?>
+<file path=customXml/itemProps12.xml><?xml version="1.0" encoding="utf-8"?>
+<ds:datastoreItem xmlns:ds="http://schemas.openxmlformats.org/officeDocument/2006/customXml" ds:itemID="{8E2F9F58-B867-4300-B14F-03788C72EF13}">
+  <ds:schemaRefs>
+    <ds:schemaRef ds:uri="http://schemas.microsoft.com/VisualStudio/2011/storyboarding/control"/>
+  </ds:schemaRefs>
+</ds:datastoreItem>
+</file>
+
+<file path=customXml/itemProps13.xml><?xml version="1.0" encoding="utf-8"?>
+<ds:datastoreItem xmlns:ds="http://schemas.openxmlformats.org/officeDocument/2006/customXml" ds:itemID="{578F7EAB-B385-4412-B031-834BFEAE47E7}">
+  <ds:schemaRefs>
+    <ds:schemaRef ds:uri="http://schemas.microsoft.com/VisualStudio/2011/storyboarding/control"/>
+  </ds:schemaRefs>
+</ds:datastoreItem>
+</file>
+
+<file path=customXml/itemProps2.xml><?xml version="1.0" encoding="utf-8"?>
 <ds:datastoreItem xmlns:ds="http://schemas.openxmlformats.org/officeDocument/2006/customXml" ds:itemID="{A1C2894E-0EF6-490D-98F3-0F8885C833C1}">
   <ds:schemaRefs>
     <ds:schemaRef ds:uri="http://schemas.microsoft.com/VisualStudio/2011/storyboarding/control"/>
@@ -7435,23 +7467,31 @@
 </ds:datastoreItem>
 </file>
 
-<file path=customXml/itemProps11.xml><?xml version="1.0" encoding="utf-8"?>
-<ds:datastoreItem xmlns:ds="http://schemas.openxmlformats.org/officeDocument/2006/customXml" ds:itemID="{578F7EAB-B385-4412-B031-834BFEAE47E7}">
+<file path=customXml/itemProps3.xml><?xml version="1.0" encoding="utf-8"?>
+<ds:datastoreItem xmlns:ds="http://schemas.openxmlformats.org/officeDocument/2006/customXml" ds:itemID="{44103AEA-0C56-4FF6-9E4E-7A017E74BCAE}">
   <ds:schemaRefs>
     <ds:schemaRef ds:uri="http://schemas.microsoft.com/VisualStudio/2011/storyboarding/control"/>
   </ds:schemaRefs>
 </ds:datastoreItem>
 </file>
 
-<file path=customXml/itemProps12.xml><?xml version="1.0" encoding="utf-8"?>
-<ds:datastoreItem xmlns:ds="http://schemas.openxmlformats.org/officeDocument/2006/customXml" ds:itemID="{3D65AE49-FBC6-4E7F-901D-C65A02B2FD50}">
+<file path=customXml/itemProps4.xml><?xml version="1.0" encoding="utf-8"?>
+<ds:datastoreItem xmlns:ds="http://schemas.openxmlformats.org/officeDocument/2006/customXml" ds:itemID="{6021BAB6-3C1A-4661-8C5F-C49D4F2B7160}">
   <ds:schemaRefs>
     <ds:schemaRef ds:uri="http://schemas.microsoft.com/VisualStudio/2011/storyboarding/control"/>
   </ds:schemaRefs>
 </ds:datastoreItem>
 </file>
 
-<file path=customXml/itemProps13.xml><?xml version="1.0" encoding="utf-8"?>
+<file path=customXml/itemProps5.xml><?xml version="1.0" encoding="utf-8"?>
+<ds:datastoreItem xmlns:ds="http://schemas.openxmlformats.org/officeDocument/2006/customXml" ds:itemID="{315DAE89-8A24-4ABD-9D08-1AF01E0131C4}">
+  <ds:schemaRefs>
+    <ds:schemaRef ds:uri="http://schemas.microsoft.com/VisualStudio/2011/storyboarding/control"/>
+  </ds:schemaRefs>
+</ds:datastoreItem>
+</file>
+
+<file path=customXml/itemProps6.xml><?xml version="1.0" encoding="utf-8"?>
 <ds:datastoreItem xmlns:ds="http://schemas.openxmlformats.org/officeDocument/2006/customXml" ds:itemID="{59B08748-3D28-4434-AF2E-A047A5316D88}">
   <ds:schemaRefs>
     <ds:schemaRef ds:uri="http://schemas.microsoft.com/VisualStudio/2011/storyboarding/control"/>
@@ -7459,15 +7499,7 @@
 </ds:datastoreItem>
 </file>
 
-<file path=customXml/itemProps2.xml><?xml version="1.0" encoding="utf-8"?>
-<ds:datastoreItem xmlns:ds="http://schemas.openxmlformats.org/officeDocument/2006/customXml" ds:itemID="{A0ACBFB0-2DCA-46A6-9DA4-D63F80C0E485}">
-  <ds:schemaRefs>
-    <ds:schemaRef ds:uri="http://schemas.microsoft.com/VisualStudio/2011/storyboarding/control"/>
-  </ds:schemaRefs>
-</ds:datastoreItem>
-</file>
-
-<file path=customXml/itemProps3.xml><?xml version="1.0" encoding="utf-8"?>
+<file path=customXml/itemProps7.xml><?xml version="1.0" encoding="utf-8"?>
 <ds:datastoreItem xmlns:ds="http://schemas.openxmlformats.org/officeDocument/2006/customXml" ds:itemID="{E91F7B6A-04F0-4A89-9A6B-F58E962957D7}">
   <ds:schemaRefs>
     <ds:schemaRef ds:uri="http://schemas.microsoft.com/VisualStudio/2011/storyboarding/control"/>
@@ -7475,31 +7507,7 @@
 </ds:datastoreItem>
 </file>
 
-<file path=customXml/itemProps4.xml><?xml version="1.0" encoding="utf-8"?>
-<ds:datastoreItem xmlns:ds="http://schemas.openxmlformats.org/officeDocument/2006/customXml" ds:itemID="{44103AEA-0C56-4FF6-9E4E-7A017E74BCAE}">
-  <ds:schemaRefs>
-    <ds:schemaRef ds:uri="http://schemas.microsoft.com/VisualStudio/2011/storyboarding/control"/>
-  </ds:schemaRefs>
-</ds:datastoreItem>
-</file>
-
-<file path=customXml/itemProps5.xml><?xml version="1.0" encoding="utf-8"?>
-<ds:datastoreItem xmlns:ds="http://schemas.openxmlformats.org/officeDocument/2006/customXml" ds:itemID="{825FAB6A-4A4D-4DA3-B2C3-45CDD3B87FC7}">
-  <ds:schemaRefs>
-    <ds:schemaRef ds:uri="http://schemas.microsoft.com/VisualStudio/2011/storyboarding/control"/>
-  </ds:schemaRefs>
-</ds:datastoreItem>
-</file>
-
-<file path=customXml/itemProps6.xml><?xml version="1.0" encoding="utf-8"?>
-<ds:datastoreItem xmlns:ds="http://schemas.openxmlformats.org/officeDocument/2006/customXml" ds:itemID="{8E2F9F58-B867-4300-B14F-03788C72EF13}">
-  <ds:schemaRefs>
-    <ds:schemaRef ds:uri="http://schemas.microsoft.com/VisualStudio/2011/storyboarding/control"/>
-  </ds:schemaRefs>
-</ds:datastoreItem>
-</file>
-
-<file path=customXml/itemProps7.xml><?xml version="1.0" encoding="utf-8"?>
+<file path=customXml/itemProps8.xml><?xml version="1.0" encoding="utf-8"?>
 <ds:datastoreItem xmlns:ds="http://schemas.openxmlformats.org/officeDocument/2006/customXml" ds:itemID="{56115557-98DA-49F2-A5A6-AFF5BB10EAA2}">
   <ds:schemaRefs>
     <ds:schemaRef ds:uri="http://schemas.microsoft.com/VisualStudio/2011/storyboarding/control"/>
@@ -7507,16 +7515,8 @@
 </ds:datastoreItem>
 </file>
 
-<file path=customXml/itemProps8.xml><?xml version="1.0" encoding="utf-8"?>
-<ds:datastoreItem xmlns:ds="http://schemas.openxmlformats.org/officeDocument/2006/customXml" ds:itemID="{315DAE89-8A24-4ABD-9D08-1AF01E0131C4}">
-  <ds:schemaRefs>
-    <ds:schemaRef ds:uri="http://schemas.microsoft.com/VisualStudio/2011/storyboarding/control"/>
-  </ds:schemaRefs>
-</ds:datastoreItem>
-</file>
-
 <file path=customXml/itemProps9.xml><?xml version="1.0" encoding="utf-8"?>
-<ds:datastoreItem xmlns:ds="http://schemas.openxmlformats.org/officeDocument/2006/customXml" ds:itemID="{6021BAB6-3C1A-4661-8C5F-C49D4F2B7160}">
+<ds:datastoreItem xmlns:ds="http://schemas.openxmlformats.org/officeDocument/2006/customXml" ds:itemID="{3D65AE49-FBC6-4E7F-901D-C65A02B2FD50}">
   <ds:schemaRefs>
     <ds:schemaRef ds:uri="http://schemas.microsoft.com/VisualStudio/2011/storyboarding/control"/>
   </ds:schemaRefs>

</xml_diff>